<commit_message>
pptx mods; storing pdf too...
</commit_message>
<xml_diff>
--- a/doc/Fun_with_C++11.pptx
+++ b/doc/Fun_with_C++11.pptx
@@ -4420,7 +4420,7 @@
         <p:spPr/>
         <p:txBody>
           <a:bodyPr>
-            <a:normAutofit fontScale="85000" lnSpcReduction="10000"/>
+            <a:normAutofit fontScale="85000" lnSpcReduction="20000"/>
           </a:bodyPr>
           <a:lstStyle/>
           <a:p>
@@ -4517,7 +4517,24 @@
             <a:pPr lvl="1"/>
             <a:r>
               <a:rPr lang="en-US" dirty="0" smtClean="0"/>
-              <a:t>.NET not used in tools or Office..</a:t>
+              <a:t>.NET not used in tools or </a:t>
+            </a:r>
+            <a:r>
+              <a:rPr lang="en-US" dirty="0" smtClean="0"/>
+              <a:t>Office…</a:t>
+            </a:r>
+          </a:p>
+          <a:p>
+            <a:pPr lvl="1"/>
+            <a:r>
+              <a:rPr lang="en-US" dirty="0" smtClean="0"/>
+              <a:t>…or drivers. </a:t>
+            </a:r>
+            <a:r>
+              <a:rPr lang="en-US" dirty="0">
+                <a:sym typeface="Wingdings" panose="05000000000000000000" pitchFamily="2" charset="2"/>
+              </a:rPr>
+              <a:t></a:t>
             </a:r>
             <a:endParaRPr lang="en-US" dirty="0"/>
           </a:p>
@@ -5970,10 +5987,15 @@
             <p:ph idx="1"/>
           </p:nvPr>
         </p:nvSpPr>
-        <p:spPr/>
+        <p:spPr>
+          <a:xfrm>
+            <a:off x="457200" y="1600200"/>
+            <a:ext cx="8229600" cy="4953000"/>
+          </a:xfrm>
+        </p:spPr>
         <p:txBody>
           <a:bodyPr>
-            <a:normAutofit lnSpcReduction="10000"/>
+            <a:normAutofit fontScale="92500"/>
           </a:bodyPr>
           <a:lstStyle/>
           <a:p>
@@ -6019,6 +6041,15 @@
               <a:rPr lang="en-US" dirty="0" smtClean="0"/>
               <a:t>So much of C++11/14 Standard Library leverages Generic Programming / templates. </a:t>
             </a:r>
+            <a:endParaRPr lang="en-US" dirty="0" smtClean="0"/>
+          </a:p>
+          <a:p>
+            <a:pPr lvl="1"/>
+            <a:r>
+              <a:rPr lang="en-US" i="1" dirty="0" smtClean="0"/>
+              <a:t>Read the source, Luke: Open &lt;string&gt; for example…</a:t>
+            </a:r>
+            <a:endParaRPr lang="en-US" i="1" dirty="0" smtClean="0"/>
           </a:p>
           <a:p>
             <a:pPr marL="0" indent="0">
@@ -8383,14 +8414,24 @@
         <p:spPr/>
         <p:txBody>
           <a:bodyPr>
-            <a:normAutofit/>
+            <a:normAutofit lnSpcReduction="10000"/>
           </a:bodyPr>
           <a:lstStyle/>
           <a:p>
             <a:pPr marL="457200" lvl="1" indent="0">
               <a:buNone/>
             </a:pPr>
-            <a:endParaRPr lang="en-US" sz="1800" dirty="0" smtClean="0">
+            <a:r>
+              <a:rPr lang="en-US" sz="2400" dirty="0" smtClean="0"/>
+              <a:t>Windows driver kit (WDK):</a:t>
+            </a:r>
+            <a:endParaRPr lang="en-US" sz="2400" dirty="0"/>
+          </a:p>
+          <a:p>
+            <a:pPr marL="457200" lvl="1" indent="0">
+              <a:buNone/>
+            </a:pPr>
+            <a:endParaRPr lang="en-US" sz="2400" dirty="0" smtClean="0">
               <a:latin typeface="Consolas" panose="020B0609020204030204" pitchFamily="49" charset="0"/>
               <a:cs typeface="Consolas" panose="020B0609020204030204" pitchFamily="49" charset="0"/>
             </a:endParaRPr>
@@ -8400,35 +8441,35 @@
               <a:buNone/>
             </a:pPr>
             <a:r>
-              <a:rPr lang="en-US" sz="1800" dirty="0" smtClean="0">
+              <a:rPr lang="en-US" sz="2400" dirty="0" smtClean="0">
                 <a:latin typeface="Consolas" panose="020B0609020204030204" pitchFamily="49" charset="0"/>
                 <a:cs typeface="Consolas" panose="020B0609020204030204" pitchFamily="49" charset="0"/>
               </a:rPr>
               <a:t>c</a:t>
             </a:r>
             <a:r>
-              <a:rPr lang="en-US" sz="1800" dirty="0">
+              <a:rPr lang="en-US" sz="2400" dirty="0">
                 <a:latin typeface="Consolas" panose="020B0609020204030204" pitchFamily="49" charset="0"/>
                 <a:cs typeface="Consolas" panose="020B0609020204030204" pitchFamily="49" charset="0"/>
               </a:rPr>
               <a:t>:\apps\WinDDK\7600.16385.1</a:t>
             </a:r>
             <a:r>
-              <a:rPr lang="en-US" sz="1800" dirty="0" smtClean="0">
+              <a:rPr lang="en-US" sz="2400" dirty="0" smtClean="0">
                 <a:latin typeface="Consolas" panose="020B0609020204030204" pitchFamily="49" charset="0"/>
                 <a:cs typeface="Consolas" panose="020B0609020204030204" pitchFamily="49" charset="0"/>
               </a:rPr>
               <a:t>&gt; </a:t>
             </a:r>
             <a:r>
-              <a:rPr lang="en-US" sz="1800" b="1" dirty="0" smtClean="0">
+              <a:rPr lang="en-US" sz="2400" b="1" dirty="0" smtClean="0">
                 <a:latin typeface="Consolas" panose="020B0609020204030204" pitchFamily="49" charset="0"/>
                 <a:cs typeface="Consolas" panose="020B0609020204030204" pitchFamily="49" charset="0"/>
               </a:rPr>
               <a:t>bin\setenv.bat </a:t>
             </a:r>
             <a:r>
-              <a:rPr lang="en-US" sz="1800" b="1" dirty="0">
+              <a:rPr lang="en-US" sz="2400" b="1" dirty="0">
                 <a:latin typeface="Consolas" panose="020B0609020204030204" pitchFamily="49" charset="0"/>
                 <a:cs typeface="Consolas" panose="020B0609020204030204" pitchFamily="49" charset="0"/>
               </a:rPr>
@@ -8439,7 +8480,7 @@
             <a:pPr marL="457200" lvl="1" indent="0">
               <a:buNone/>
             </a:pPr>
-            <a:endParaRPr lang="en-US" sz="1800" dirty="0">
+            <a:endParaRPr lang="en-US" sz="2400" dirty="0">
               <a:latin typeface="Consolas" panose="020B0609020204030204" pitchFamily="49" charset="0"/>
               <a:cs typeface="Consolas" panose="020B0609020204030204" pitchFamily="49" charset="0"/>
             </a:endParaRPr>
@@ -8449,27 +8490,27 @@
               <a:buNone/>
             </a:pPr>
             <a:r>
-              <a:rPr lang="en-US" sz="1800" dirty="0">
+              <a:rPr lang="en-US" sz="2400" dirty="0">
                 <a:latin typeface="Consolas" panose="020B0609020204030204" pitchFamily="49" charset="0"/>
                 <a:cs typeface="Consolas" panose="020B0609020204030204" pitchFamily="49" charset="0"/>
               </a:rPr>
               <a:t>c:\apps\WinDDK\7600.16385.1</a:t>
             </a:r>
             <a:r>
-              <a:rPr lang="en-US" sz="1800" dirty="0" smtClean="0">
+              <a:rPr lang="en-US" sz="2400" dirty="0" smtClean="0">
                 <a:latin typeface="Consolas" panose="020B0609020204030204" pitchFamily="49" charset="0"/>
                 <a:cs typeface="Consolas" panose="020B0609020204030204" pitchFamily="49" charset="0"/>
               </a:rPr>
               <a:t>&gt; </a:t>
             </a:r>
             <a:r>
-              <a:rPr lang="en-US" sz="1800" b="1" dirty="0" smtClean="0">
+              <a:rPr lang="en-US" sz="2400" b="1" dirty="0" smtClean="0">
                 <a:latin typeface="Consolas" panose="020B0609020204030204" pitchFamily="49" charset="0"/>
                 <a:cs typeface="Consolas" panose="020B0609020204030204" pitchFamily="49" charset="0"/>
               </a:rPr>
               <a:t>cl.exe</a:t>
             </a:r>
-            <a:endParaRPr lang="en-US" sz="1800" b="1" dirty="0">
+            <a:endParaRPr lang="en-US" sz="2400" b="1" dirty="0">
               <a:latin typeface="Consolas" panose="020B0609020204030204" pitchFamily="49" charset="0"/>
               <a:cs typeface="Consolas" panose="020B0609020204030204" pitchFamily="49" charset="0"/>
             </a:endParaRPr>
@@ -8478,7 +8519,7 @@
             <a:pPr marL="457200" lvl="1" indent="0">
               <a:buNone/>
             </a:pPr>
-            <a:endParaRPr lang="en-US" sz="1800" dirty="0">
+            <a:endParaRPr lang="en-US" sz="2400" dirty="0">
               <a:latin typeface="Consolas" panose="020B0609020204030204" pitchFamily="49" charset="0"/>
               <a:cs typeface="Consolas" panose="020B0609020204030204" pitchFamily="49" charset="0"/>
             </a:endParaRPr>
@@ -8488,28 +8529,28 @@
               <a:buNone/>
             </a:pPr>
             <a:r>
-              <a:rPr lang="en-US" sz="1800" dirty="0">
+              <a:rPr lang="en-US" sz="2400" dirty="0">
                 <a:latin typeface="Consolas" panose="020B0609020204030204" pitchFamily="49" charset="0"/>
                 <a:cs typeface="Consolas" panose="020B0609020204030204" pitchFamily="49" charset="0"/>
               </a:rPr>
               <a:t>Microsoft (R) 32-bit C/C++ Optimizing Compiler Version </a:t>
             </a:r>
             <a:r>
-              <a:rPr lang="en-US" sz="1800" b="1" dirty="0">
+              <a:rPr lang="en-US" sz="2400" b="1" dirty="0">
                 <a:latin typeface="Consolas" panose="020B0609020204030204" pitchFamily="49" charset="0"/>
                 <a:cs typeface="Consolas" panose="020B0609020204030204" pitchFamily="49" charset="0"/>
               </a:rPr>
               <a:t>15.00.30729.207</a:t>
             </a:r>
             <a:r>
-              <a:rPr lang="en-US" sz="1800" dirty="0">
+              <a:rPr lang="en-US" sz="2400" dirty="0">
                 <a:latin typeface="Consolas" panose="020B0609020204030204" pitchFamily="49" charset="0"/>
                 <a:cs typeface="Consolas" panose="020B0609020204030204" pitchFamily="49" charset="0"/>
               </a:rPr>
               <a:t> for </a:t>
             </a:r>
             <a:r>
-              <a:rPr lang="en-US" sz="1800" dirty="0" smtClean="0">
+              <a:rPr lang="en-US" sz="2400" dirty="0" smtClean="0">
                 <a:latin typeface="Consolas" panose="020B0609020204030204" pitchFamily="49" charset="0"/>
                 <a:cs typeface="Consolas" panose="020B0609020204030204" pitchFamily="49" charset="0"/>
               </a:rPr>
@@ -8520,7 +8561,7 @@
             <a:pPr marL="457200" lvl="1" indent="0">
               <a:buNone/>
             </a:pPr>
-            <a:endParaRPr lang="en-US" sz="1800" dirty="0">
+            <a:endParaRPr lang="en-US" sz="2400" dirty="0">
               <a:latin typeface="Consolas" panose="020B0609020204030204" pitchFamily="49" charset="0"/>
               <a:cs typeface="Consolas" panose="020B0609020204030204" pitchFamily="49" charset="0"/>
             </a:endParaRPr>
@@ -8530,38 +8571,10 @@
               <a:buNone/>
             </a:pPr>
             <a:r>
-              <a:rPr lang="en-US" sz="1800" dirty="0">
-                <a:latin typeface="Consolas" panose="020B0609020204030204" pitchFamily="49" charset="0"/>
-                <a:cs typeface="Consolas" panose="020B0609020204030204" pitchFamily="49" charset="0"/>
-              </a:rPr>
-              <a:t>Copyright (C) Microsoft Corporation.  All rights reserved.</a:t>
-            </a:r>
-          </a:p>
-          <a:p>
-            <a:pPr marL="457200" lvl="1" indent="0">
-              <a:buNone/>
-            </a:pPr>
-            <a:r>
-              <a:rPr lang="en-US" sz="1800" dirty="0">
-                <a:latin typeface="Consolas" panose="020B0609020204030204" pitchFamily="49" charset="0"/>
-                <a:cs typeface="Consolas" panose="020B0609020204030204" pitchFamily="49" charset="0"/>
-              </a:rPr>
-              <a:t>usage: cl [ option... ] filename... [ /link </a:t>
-            </a:r>
-            <a:r>
-              <a:rPr lang="en-US" sz="1800" dirty="0" err="1">
-                <a:latin typeface="Consolas" panose="020B0609020204030204" pitchFamily="49" charset="0"/>
-                <a:cs typeface="Consolas" panose="020B0609020204030204" pitchFamily="49" charset="0"/>
-              </a:rPr>
-              <a:t>linkoption</a:t>
-            </a:r>
-            <a:r>
-              <a:rPr lang="en-US" sz="1800" dirty="0">
-                <a:latin typeface="Consolas" panose="020B0609020204030204" pitchFamily="49" charset="0"/>
-                <a:cs typeface="Consolas" panose="020B0609020204030204" pitchFamily="49" charset="0"/>
-              </a:rPr>
-              <a:t>... ]</a:t>
-            </a:r>
+              <a:rPr lang="en-US" sz="2400" dirty="0" smtClean="0"/>
+              <a:t>This is C++ ’03’</a:t>
+            </a:r>
+            <a:endParaRPr lang="en-US" sz="2400" dirty="0"/>
           </a:p>
           <a:p>
             <a:pPr lvl="1"/>
@@ -9311,7 +9324,12 @@
             <p:ph idx="1"/>
           </p:nvPr>
         </p:nvSpPr>
-        <p:spPr/>
+        <p:spPr>
+          <a:xfrm>
+            <a:off x="457200" y="1600200"/>
+            <a:ext cx="8229600" cy="4953000"/>
+          </a:xfrm>
+        </p:spPr>
         <p:txBody>
           <a:bodyPr>
             <a:normAutofit fontScale="62500" lnSpcReduction="20000"/>
@@ -9388,7 +9406,21 @@
                 <a:latin typeface="Consolas" panose="020B0609020204030204" pitchFamily="49" charset="0"/>
                 <a:cs typeface="Consolas" panose="020B0609020204030204" pitchFamily="49" charset="0"/>
               </a:rPr>
-              <a:t>	// C++ runtime; 600+ Kb</a:t>
+              <a:t>	</a:t>
+            </a:r>
+            <a:r>
+              <a:rPr lang="en-US" dirty="0" smtClean="0">
+                <a:latin typeface="Consolas" panose="020B0609020204030204" pitchFamily="49" charset="0"/>
+                <a:cs typeface="Consolas" panose="020B0609020204030204" pitchFamily="49" charset="0"/>
+              </a:rPr>
+              <a:t> // </a:t>
+            </a:r>
+            <a:r>
+              <a:rPr lang="en-US" dirty="0" smtClean="0">
+                <a:latin typeface="Consolas" panose="020B0609020204030204" pitchFamily="49" charset="0"/>
+                <a:cs typeface="Consolas" panose="020B0609020204030204" pitchFamily="49" charset="0"/>
+              </a:rPr>
+              <a:t>C++ runtime; 600+ Kb</a:t>
             </a:r>
             <a:endParaRPr lang="en-US" dirty="0">
               <a:latin typeface="Consolas" panose="020B0609020204030204" pitchFamily="49" charset="0"/>
@@ -9421,7 +9453,21 @@
                 <a:latin typeface="Consolas" panose="020B0609020204030204" pitchFamily="49" charset="0"/>
                 <a:cs typeface="Consolas" panose="020B0609020204030204" pitchFamily="49" charset="0"/>
               </a:rPr>
-              <a:t>	// C runtime; 2+ Mb</a:t>
+              <a:t>	</a:t>
+            </a:r>
+            <a:r>
+              <a:rPr lang="en-US" dirty="0" smtClean="0">
+                <a:latin typeface="Consolas" panose="020B0609020204030204" pitchFamily="49" charset="0"/>
+                <a:cs typeface="Consolas" panose="020B0609020204030204" pitchFamily="49" charset="0"/>
+              </a:rPr>
+              <a:t> // </a:t>
+            </a:r>
+            <a:r>
+              <a:rPr lang="en-US" dirty="0" smtClean="0">
+                <a:latin typeface="Consolas" panose="020B0609020204030204" pitchFamily="49" charset="0"/>
+                <a:cs typeface="Consolas" panose="020B0609020204030204" pitchFamily="49" charset="0"/>
+              </a:rPr>
+              <a:t>C runtime; 2+ Mb</a:t>
             </a:r>
             <a:endParaRPr lang="en-US" dirty="0">
               <a:latin typeface="Consolas" panose="020B0609020204030204" pitchFamily="49" charset="0"/>
@@ -9444,14 +9490,14 @@
                 <a:latin typeface="Consolas" panose="020B0609020204030204" pitchFamily="49" charset="0"/>
                 <a:cs typeface="Consolas" panose="020B0609020204030204" pitchFamily="49" charset="0"/>
               </a:rPr>
-              <a:t>vccorlib120.dll 	// C++/CLI </a:t>
-            </a:r>
-            <a:r>
-              <a:rPr lang="en-US" smtClean="0">
-                <a:latin typeface="Consolas" panose="020B0609020204030204" pitchFamily="49" charset="0"/>
-                <a:cs typeface="Consolas" panose="020B0609020204030204" pitchFamily="49" charset="0"/>
-              </a:rPr>
-              <a:t>(.NET)</a:t>
+              <a:t>vccorlib120.dll    // </a:t>
+            </a:r>
+            <a:r>
+              <a:rPr lang="en-US" dirty="0" smtClean="0">
+                <a:latin typeface="Consolas" panose="020B0609020204030204" pitchFamily="49" charset="0"/>
+                <a:cs typeface="Consolas" panose="020B0609020204030204" pitchFamily="49" charset="0"/>
+              </a:rPr>
+              <a:t>C++/CLI (.NET)</a:t>
             </a:r>
             <a:endParaRPr lang="en-US" dirty="0">
               <a:latin typeface="Consolas" panose="020B0609020204030204" pitchFamily="49" charset="0"/>
@@ -9467,14 +9513,7 @@
                 <a:latin typeface="Consolas" panose="020B0609020204030204" pitchFamily="49" charset="0"/>
                 <a:cs typeface="Consolas" panose="020B0609020204030204" pitchFamily="49" charset="0"/>
               </a:rPr>
-              <a:t>+---</a:t>
-            </a:r>
-            <a:r>
-              <a:rPr lang="en-US" dirty="0">
-                <a:latin typeface="Consolas" panose="020B0609020204030204" pitchFamily="49" charset="0"/>
-                <a:cs typeface="Consolas" panose="020B0609020204030204" pitchFamily="49" charset="0"/>
-              </a:rPr>
-              <a:t>Microsoft.VC120.CXXAMP</a:t>
+              <a:t>+---Microsoft.VC120.CXXAMP // ‘accelerated massive</a:t>
             </a:r>
           </a:p>
           <a:p>
@@ -9482,7 +9521,19 @@
               <a:buNone/>
             </a:pPr>
             <a:r>
-              <a:rPr lang="en-US" dirty="0">
+              <a:rPr lang="en-US" dirty="0" smtClean="0">
+                <a:latin typeface="Consolas" panose="020B0609020204030204" pitchFamily="49" charset="0"/>
+                <a:cs typeface="Consolas" panose="020B0609020204030204" pitchFamily="49" charset="0"/>
+              </a:rPr>
+              <a:t>                           //    parallelism’</a:t>
+            </a:r>
+          </a:p>
+          <a:p>
+            <a:pPr marL="0" indent="0">
+              <a:buNone/>
+            </a:pPr>
+            <a:r>
+              <a:rPr lang="en-US" dirty="0" smtClean="0">
                 <a:latin typeface="Consolas" panose="020B0609020204030204" pitchFamily="49" charset="0"/>
                 <a:cs typeface="Consolas" panose="020B0609020204030204" pitchFamily="49" charset="0"/>
               </a:rPr>
@@ -9498,90 +9549,7 @@
                 <a:latin typeface="Consolas" panose="020B0609020204030204" pitchFamily="49" charset="0"/>
                 <a:cs typeface="Consolas" panose="020B0609020204030204" pitchFamily="49" charset="0"/>
               </a:rPr>
-              <a:t>+---</a:t>
-            </a:r>
-            <a:r>
-              <a:rPr lang="en-US" dirty="0">
-                <a:latin typeface="Consolas" panose="020B0609020204030204" pitchFamily="49" charset="0"/>
-                <a:cs typeface="Consolas" panose="020B0609020204030204" pitchFamily="49" charset="0"/>
-              </a:rPr>
-              <a:t>Microsoft.VC120.MFC</a:t>
-            </a:r>
-          </a:p>
-          <a:p>
-            <a:pPr marL="0" indent="0">
-              <a:buNone/>
-            </a:pPr>
-            <a:r>
-              <a:rPr lang="en-US" dirty="0">
-                <a:latin typeface="Consolas" panose="020B0609020204030204" pitchFamily="49" charset="0"/>
-                <a:cs typeface="Consolas" panose="020B0609020204030204" pitchFamily="49" charset="0"/>
-              </a:rPr>
-              <a:t>|       mfc120u.dll</a:t>
-            </a:r>
-          </a:p>
-          <a:p>
-            <a:pPr marL="0" indent="0">
-              <a:buNone/>
-            </a:pPr>
-            <a:r>
-              <a:rPr lang="en-US" dirty="0">
-                <a:latin typeface="Consolas" panose="020B0609020204030204" pitchFamily="49" charset="0"/>
-                <a:cs typeface="Consolas" panose="020B0609020204030204" pitchFamily="49" charset="0"/>
-              </a:rPr>
-              <a:t>|       mfcm120u.dll</a:t>
-            </a:r>
-          </a:p>
-          <a:p>
-            <a:pPr marL="0" indent="0">
-              <a:buNone/>
-            </a:pPr>
-            <a:r>
-              <a:rPr lang="en-US" dirty="0" smtClean="0">
-                <a:latin typeface="Consolas" panose="020B0609020204030204" pitchFamily="49" charset="0"/>
-                <a:cs typeface="Consolas" panose="020B0609020204030204" pitchFamily="49" charset="0"/>
-              </a:rPr>
-              <a:t>+---</a:t>
-            </a:r>
-            <a:r>
-              <a:rPr lang="en-US" dirty="0">
-                <a:latin typeface="Consolas" panose="020B0609020204030204" pitchFamily="49" charset="0"/>
-                <a:cs typeface="Consolas" panose="020B0609020204030204" pitchFamily="49" charset="0"/>
-              </a:rPr>
-              <a:t>Microsoft.VC120.MFCLOC</a:t>
-            </a:r>
-          </a:p>
-          <a:p>
-            <a:pPr marL="0" indent="0">
-              <a:buNone/>
-            </a:pPr>
-            <a:r>
-              <a:rPr lang="en-US" dirty="0">
-                <a:latin typeface="Consolas" panose="020B0609020204030204" pitchFamily="49" charset="0"/>
-                <a:cs typeface="Consolas" panose="020B0609020204030204" pitchFamily="49" charset="0"/>
-              </a:rPr>
-              <a:t>|       </a:t>
-            </a:r>
-            <a:r>
-              <a:rPr lang="en-US" dirty="0" smtClean="0">
-                <a:latin typeface="Consolas" panose="020B0609020204030204" pitchFamily="49" charset="0"/>
-                <a:cs typeface="Consolas" panose="020B0609020204030204" pitchFamily="49" charset="0"/>
-              </a:rPr>
-              <a:t>//</a:t>
-            </a:r>
-            <a:r>
-              <a:rPr lang="en-US" dirty="0" err="1" smtClean="0">
-                <a:latin typeface="Consolas" panose="020B0609020204030204" pitchFamily="49" charset="0"/>
-                <a:cs typeface="Consolas" panose="020B0609020204030204" pitchFamily="49" charset="0"/>
-              </a:rPr>
-              <a:t>mfc</a:t>
-            </a:r>
-            <a:r>
-              <a:rPr lang="en-US" dirty="0" smtClean="0">
-                <a:latin typeface="Consolas" panose="020B0609020204030204" pitchFamily="49" charset="0"/>
-                <a:cs typeface="Consolas" panose="020B0609020204030204" pitchFamily="49" charset="0"/>
-              </a:rPr>
-              <a:t> localized stuff</a:t>
+              <a:t>+---Microsoft.VC120.MFC</a:t>
             </a:r>
             <a:endParaRPr lang="en-US" dirty="0">
               <a:latin typeface="Consolas" panose="020B0609020204030204" pitchFamily="49" charset="0"/>
@@ -9593,6 +9561,30 @@
               <a:buNone/>
             </a:pPr>
             <a:r>
+              <a:rPr lang="en-US" dirty="0">
+                <a:latin typeface="Consolas" panose="020B0609020204030204" pitchFamily="49" charset="0"/>
+                <a:cs typeface="Consolas" panose="020B0609020204030204" pitchFamily="49" charset="0"/>
+              </a:rPr>
+              <a:t>|       mfc120u.dll</a:t>
+            </a:r>
+          </a:p>
+          <a:p>
+            <a:pPr marL="0" indent="0">
+              <a:buNone/>
+            </a:pPr>
+            <a:r>
+              <a:rPr lang="en-US" dirty="0">
+                <a:latin typeface="Consolas" panose="020B0609020204030204" pitchFamily="49" charset="0"/>
+                <a:cs typeface="Consolas" panose="020B0609020204030204" pitchFamily="49" charset="0"/>
+              </a:rPr>
+              <a:t>|       mfcm120u.dll</a:t>
+            </a:r>
+          </a:p>
+          <a:p>
+            <a:pPr marL="0" indent="0">
+              <a:buNone/>
+            </a:pPr>
+            <a:r>
               <a:rPr lang="en-US" dirty="0" smtClean="0">
                 <a:latin typeface="Consolas" panose="020B0609020204030204" pitchFamily="49" charset="0"/>
                 <a:cs typeface="Consolas" panose="020B0609020204030204" pitchFamily="49" charset="0"/>
@@ -9616,13 +9608,38 @@
                 <a:latin typeface="Consolas" panose="020B0609020204030204" pitchFamily="49" charset="0"/>
                 <a:cs typeface="Consolas" panose="020B0609020204030204" pitchFamily="49" charset="0"/>
               </a:rPr>
-              <a:t>        vcomp120.dll</a:t>
+              <a:t>        </a:t>
+            </a:r>
+            <a:r>
+              <a:rPr lang="en-US" dirty="0" smtClean="0">
+                <a:latin typeface="Consolas" panose="020B0609020204030204" pitchFamily="49" charset="0"/>
+                <a:cs typeface="Consolas" panose="020B0609020204030204" pitchFamily="49" charset="0"/>
+              </a:rPr>
+              <a:t>vcomp120.dll</a:t>
             </a:r>
           </a:p>
           <a:p>
             <a:pPr marL="0" indent="0">
               <a:buNone/>
             </a:pPr>
+            <a:endParaRPr lang="en-US" dirty="0" smtClean="0"/>
+          </a:p>
+          <a:p>
+            <a:pPr marL="0" indent="0">
+              <a:buNone/>
+            </a:pPr>
+            <a:r>
+              <a:rPr lang="en-US" dirty="0" smtClean="0"/>
+              <a:t>That last one: “…multi-platform </a:t>
+            </a:r>
+            <a:r>
+              <a:rPr lang="en-US" dirty="0"/>
+              <a:t>shared-memory parallel programming in C/C++ and </a:t>
+            </a:r>
+            <a:r>
+              <a:rPr lang="en-US" dirty="0" smtClean="0"/>
+              <a:t>Fortran”</a:t>
+            </a:r>
             <a:endParaRPr lang="en-US" dirty="0"/>
           </a:p>
         </p:txBody>
@@ -13962,10 +13979,15 @@
             <p:ph idx="1"/>
           </p:nvPr>
         </p:nvSpPr>
-        <p:spPr/>
+        <p:spPr>
+          <a:xfrm>
+            <a:off x="457200" y="1600200"/>
+            <a:ext cx="8229600" cy="4953000"/>
+          </a:xfrm>
+        </p:spPr>
         <p:txBody>
           <a:bodyPr>
-            <a:normAutofit/>
+            <a:normAutofit lnSpcReduction="10000"/>
           </a:bodyPr>
           <a:lstStyle/>
           <a:p>
@@ -13977,8 +13999,12 @@
           <a:p>
             <a:pPr lvl="1"/>
             <a:r>
-              <a:rPr lang="en-US" dirty="0" smtClean="0"/>
-              <a:t>Caveat from Google </a:t>
+              <a:rPr lang="en-US" b="1" dirty="0" smtClean="0"/>
+              <a:t>Caveat</a:t>
+            </a:r>
+            <a:r>
+              <a:rPr lang="en-US" dirty="0" smtClean="0"/>
+              <a:t> from Google </a:t>
             </a:r>
             <a:r>
               <a:rPr lang="en-US" dirty="0" err="1" smtClean="0"/>
@@ -13993,7 +14019,7 @@
             <a:pPr marL="0" indent="0">
               <a:buNone/>
             </a:pPr>
-            <a:endParaRPr lang="en-US" sz="1200" dirty="0" smtClean="0">
+            <a:endParaRPr lang="en-US" sz="1600" dirty="0" smtClean="0">
               <a:latin typeface="Consolas" panose="020B0609020204030204" pitchFamily="49" charset="0"/>
               <a:cs typeface="Consolas" panose="020B0609020204030204" pitchFamily="49" charset="0"/>
             </a:endParaRPr>
@@ -14003,21 +14029,21 @@
               <a:buNone/>
             </a:pPr>
             <a:r>
-              <a:rPr lang="en-US" sz="1200" dirty="0" smtClean="0">
+              <a:rPr lang="en-US" sz="1600" dirty="0" smtClean="0">
                 <a:latin typeface="Consolas" panose="020B0609020204030204" pitchFamily="49" charset="0"/>
                 <a:cs typeface="Consolas" panose="020B0609020204030204" pitchFamily="49" charset="0"/>
               </a:rPr>
               <a:t>  namespace </a:t>
             </a:r>
             <a:r>
-              <a:rPr lang="en-US" sz="1200" dirty="0" err="1">
+              <a:rPr lang="en-US" sz="1600" dirty="0" err="1">
                 <a:latin typeface="Consolas" panose="020B0609020204030204" pitchFamily="49" charset="0"/>
                 <a:cs typeface="Consolas" panose="020B0609020204030204" pitchFamily="49" charset="0"/>
               </a:rPr>
               <a:t>flatbuffers</a:t>
             </a:r>
             <a:r>
-              <a:rPr lang="en-US" sz="1200" dirty="0">
+              <a:rPr lang="en-US" sz="1600" dirty="0">
                 <a:latin typeface="Consolas" panose="020B0609020204030204" pitchFamily="49" charset="0"/>
                 <a:cs typeface="Consolas" panose="020B0609020204030204" pitchFamily="49" charset="0"/>
               </a:rPr>
@@ -14029,14 +14055,14 @@
               <a:buNone/>
             </a:pPr>
             <a:r>
-              <a:rPr lang="en-US" sz="1200" dirty="0" smtClean="0">
+              <a:rPr lang="en-US" sz="1600" dirty="0" smtClean="0">
                 <a:latin typeface="Consolas" panose="020B0609020204030204" pitchFamily="49" charset="0"/>
                 <a:cs typeface="Consolas" panose="020B0609020204030204" pitchFamily="49" charset="0"/>
               </a:rPr>
               <a:t>    // </a:t>
             </a:r>
             <a:r>
-              <a:rPr lang="en-US" sz="1200" dirty="0">
+              <a:rPr lang="en-US" sz="1600" dirty="0">
                 <a:latin typeface="Consolas" panose="020B0609020204030204" pitchFamily="49" charset="0"/>
                 <a:cs typeface="Consolas" panose="020B0609020204030204" pitchFamily="49" charset="0"/>
               </a:rPr>
@@ -14048,60 +14074,60 @@
               <a:buNone/>
             </a:pPr>
             <a:r>
-              <a:rPr lang="en-US" sz="1200" dirty="0" smtClean="0">
+              <a:rPr lang="en-US" sz="1600" dirty="0" smtClean="0">
                 <a:latin typeface="Consolas" panose="020B0609020204030204" pitchFamily="49" charset="0"/>
                 <a:cs typeface="Consolas" panose="020B0609020204030204" pitchFamily="49" charset="0"/>
               </a:rPr>
               <a:t>    // </a:t>
             </a:r>
             <a:r>
-              <a:rPr lang="en-US" sz="1200" dirty="0">
+              <a:rPr lang="en-US" sz="1600" dirty="0">
                 <a:latin typeface="Consolas" panose="020B0609020204030204" pitchFamily="49" charset="0"/>
                 <a:cs typeface="Consolas" panose="020B0609020204030204" pitchFamily="49" charset="0"/>
               </a:rPr>
               <a:t>In contrast to </a:t>
             </a:r>
             <a:r>
-              <a:rPr lang="en-US" sz="1200" dirty="0" err="1">
+              <a:rPr lang="en-US" sz="1600" dirty="0" err="1">
                 <a:latin typeface="Consolas" panose="020B0609020204030204" pitchFamily="49" charset="0"/>
                 <a:cs typeface="Consolas" panose="020B0609020204030204" pitchFamily="49" charset="0"/>
               </a:rPr>
               <a:t>std</a:t>
             </a:r>
             <a:r>
-              <a:rPr lang="en-US" sz="1200" dirty="0">
+              <a:rPr lang="en-US" sz="1600" dirty="0">
                 <a:latin typeface="Consolas" panose="020B0609020204030204" pitchFamily="49" charset="0"/>
                 <a:cs typeface="Consolas" panose="020B0609020204030204" pitchFamily="49" charset="0"/>
               </a:rPr>
               <a:t>::</a:t>
             </a:r>
             <a:r>
-              <a:rPr lang="en-US" sz="1200" dirty="0" err="1">
+              <a:rPr lang="en-US" sz="1600" dirty="0" err="1">
                 <a:latin typeface="Consolas" panose="020B0609020204030204" pitchFamily="49" charset="0"/>
                 <a:cs typeface="Consolas" panose="020B0609020204030204" pitchFamily="49" charset="0"/>
               </a:rPr>
               <a:t>stringstream</a:t>
             </a:r>
             <a:r>
-              <a:rPr lang="en-US" sz="1200" dirty="0">
+              <a:rPr lang="en-US" sz="1600" dirty="0">
                 <a:latin typeface="Consolas" panose="020B0609020204030204" pitchFamily="49" charset="0"/>
                 <a:cs typeface="Consolas" panose="020B0609020204030204" pitchFamily="49" charset="0"/>
               </a:rPr>
               <a:t>, "char" values </a:t>
             </a:r>
             <a:r>
-              <a:rPr lang="en-US" sz="1200" dirty="0" smtClean="0">
-                <a:latin typeface="Consolas" panose="020B0609020204030204" pitchFamily="49" charset="0"/>
-                <a:cs typeface="Consolas" panose="020B0609020204030204" pitchFamily="49" charset="0"/>
-              </a:rPr>
-              <a:t>are converted </a:t>
-            </a:r>
-            <a:r>
-              <a:rPr lang="en-US" sz="1200" dirty="0">
-                <a:latin typeface="Consolas" panose="020B0609020204030204" pitchFamily="49" charset="0"/>
-                <a:cs typeface="Consolas" panose="020B0609020204030204" pitchFamily="49" charset="0"/>
-              </a:rPr>
-              <a:t>to a string of digits.</a:t>
+              <a:rPr lang="en-US" sz="1600" dirty="0" smtClean="0">
+                <a:latin typeface="Consolas" panose="020B0609020204030204" pitchFamily="49" charset="0"/>
+                <a:cs typeface="Consolas" panose="020B0609020204030204" pitchFamily="49" charset="0"/>
+              </a:rPr>
+              <a:t>are </a:t>
+            </a:r>
+            <a:r>
+              <a:rPr lang="en-US" sz="1600" dirty="0" smtClean="0">
+                <a:latin typeface="Consolas" panose="020B0609020204030204" pitchFamily="49" charset="0"/>
+                <a:cs typeface="Consolas" panose="020B0609020204030204" pitchFamily="49" charset="0"/>
+              </a:rPr>
+              <a:t>converted</a:t>
             </a:r>
           </a:p>
           <a:p>
@@ -14109,63 +14135,96 @@
               <a:buNone/>
             </a:pPr>
             <a:r>
-              <a:rPr lang="en-US" sz="1200" dirty="0" smtClean="0">
+              <a:rPr lang="en-US" sz="1600" dirty="0">
+                <a:latin typeface="Consolas" panose="020B0609020204030204" pitchFamily="49" charset="0"/>
+                <a:cs typeface="Consolas" panose="020B0609020204030204" pitchFamily="49" charset="0"/>
+              </a:rPr>
+              <a:t> </a:t>
+            </a:r>
+            <a:r>
+              <a:rPr lang="en-US" sz="1600" dirty="0" smtClean="0">
+                <a:latin typeface="Consolas" panose="020B0609020204030204" pitchFamily="49" charset="0"/>
+                <a:cs typeface="Consolas" panose="020B0609020204030204" pitchFamily="49" charset="0"/>
+              </a:rPr>
+              <a:t>   // </a:t>
+            </a:r>
+            <a:r>
+              <a:rPr lang="en-US" sz="1600" dirty="0" smtClean="0">
+                <a:latin typeface="Consolas" panose="020B0609020204030204" pitchFamily="49" charset="0"/>
+                <a:cs typeface="Consolas" panose="020B0609020204030204" pitchFamily="49" charset="0"/>
+              </a:rPr>
+              <a:t>to </a:t>
+            </a:r>
+            <a:r>
+              <a:rPr lang="en-US" sz="1600" dirty="0">
+                <a:latin typeface="Consolas" panose="020B0609020204030204" pitchFamily="49" charset="0"/>
+                <a:cs typeface="Consolas" panose="020B0609020204030204" pitchFamily="49" charset="0"/>
+              </a:rPr>
+              <a:t>a string of digits.</a:t>
+            </a:r>
+          </a:p>
+          <a:p>
+            <a:pPr marL="0" indent="0">
+              <a:buNone/>
+            </a:pPr>
+            <a:r>
+              <a:rPr lang="en-US" sz="1600" dirty="0" smtClean="0">
                 <a:latin typeface="Consolas" panose="020B0609020204030204" pitchFamily="49" charset="0"/>
                 <a:cs typeface="Consolas" panose="020B0609020204030204" pitchFamily="49" charset="0"/>
               </a:rPr>
               <a:t>    template&lt;</a:t>
             </a:r>
             <a:r>
-              <a:rPr lang="en-US" sz="1200" dirty="0" err="1" smtClean="0">
+              <a:rPr lang="en-US" sz="1600" dirty="0" err="1" smtClean="0">
                 <a:latin typeface="Consolas" panose="020B0609020204030204" pitchFamily="49" charset="0"/>
                 <a:cs typeface="Consolas" panose="020B0609020204030204" pitchFamily="49" charset="0"/>
               </a:rPr>
               <a:t>typename</a:t>
             </a:r>
             <a:r>
-              <a:rPr lang="en-US" sz="1200" dirty="0" smtClean="0">
+              <a:rPr lang="en-US" sz="1600" dirty="0" smtClean="0">
                 <a:latin typeface="Consolas" panose="020B0609020204030204" pitchFamily="49" charset="0"/>
                 <a:cs typeface="Consolas" panose="020B0609020204030204" pitchFamily="49" charset="0"/>
               </a:rPr>
               <a:t> </a:t>
             </a:r>
             <a:r>
-              <a:rPr lang="en-US" sz="1200" dirty="0">
+              <a:rPr lang="en-US" sz="1600" dirty="0">
                 <a:latin typeface="Consolas" panose="020B0609020204030204" pitchFamily="49" charset="0"/>
                 <a:cs typeface="Consolas" panose="020B0609020204030204" pitchFamily="49" charset="0"/>
               </a:rPr>
               <a:t>T&gt; </a:t>
             </a:r>
             <a:r>
-              <a:rPr lang="en-US" sz="1200" dirty="0" err="1">
+              <a:rPr lang="en-US" sz="1600" dirty="0" err="1">
                 <a:latin typeface="Consolas" panose="020B0609020204030204" pitchFamily="49" charset="0"/>
                 <a:cs typeface="Consolas" panose="020B0609020204030204" pitchFamily="49" charset="0"/>
               </a:rPr>
               <a:t>std</a:t>
             </a:r>
             <a:r>
-              <a:rPr lang="en-US" sz="1200" dirty="0">
+              <a:rPr lang="en-US" sz="1600" dirty="0">
                 <a:latin typeface="Consolas" panose="020B0609020204030204" pitchFamily="49" charset="0"/>
                 <a:cs typeface="Consolas" panose="020B0609020204030204" pitchFamily="49" charset="0"/>
               </a:rPr>
               <a:t>::string </a:t>
             </a:r>
             <a:r>
-              <a:rPr lang="en-US" sz="1200" dirty="0" err="1">
+              <a:rPr lang="en-US" sz="1600" dirty="0" err="1">
                 <a:latin typeface="Consolas" panose="020B0609020204030204" pitchFamily="49" charset="0"/>
                 <a:cs typeface="Consolas" panose="020B0609020204030204" pitchFamily="49" charset="0"/>
               </a:rPr>
               <a:t>NumToString</a:t>
             </a:r>
             <a:r>
-              <a:rPr lang="en-US" sz="1200" dirty="0">
+              <a:rPr lang="en-US" sz="1600" dirty="0">
                 <a:latin typeface="Consolas" panose="020B0609020204030204" pitchFamily="49" charset="0"/>
                 <a:cs typeface="Consolas" panose="020B0609020204030204" pitchFamily="49" charset="0"/>
               </a:rPr>
               <a:t>(T t</a:t>
             </a:r>
             <a:r>
-              <a:rPr lang="en-US" sz="1200" dirty="0" smtClean="0">
+              <a:rPr lang="en-US" sz="1600" dirty="0" smtClean="0">
                 <a:latin typeface="Consolas" panose="020B0609020204030204" pitchFamily="49" charset="0"/>
                 <a:cs typeface="Consolas" panose="020B0609020204030204" pitchFamily="49" charset="0"/>
               </a:rPr>
@@ -14177,20 +14236,20 @@
               <a:buNone/>
             </a:pPr>
             <a:r>
-              <a:rPr lang="en-US" sz="1200" dirty="0">
+              <a:rPr lang="en-US" sz="1600" dirty="0">
                 <a:latin typeface="Consolas" panose="020B0609020204030204" pitchFamily="49" charset="0"/>
                 <a:cs typeface="Consolas" panose="020B0609020204030204" pitchFamily="49" charset="0"/>
               </a:rPr>
               <a:t> </a:t>
             </a:r>
             <a:r>
-              <a:rPr lang="en-US" sz="1200" dirty="0" smtClean="0">
+              <a:rPr lang="en-US" sz="1600" dirty="0" smtClean="0">
                 <a:latin typeface="Consolas" panose="020B0609020204030204" pitchFamily="49" charset="0"/>
                 <a:cs typeface="Consolas" panose="020B0609020204030204" pitchFamily="49" charset="0"/>
               </a:rPr>
               <a:t>  {</a:t>
             </a:r>
-            <a:endParaRPr lang="en-US" sz="1200" dirty="0">
+            <a:endParaRPr lang="en-US" sz="1600" dirty="0">
               <a:latin typeface="Consolas" panose="020B0609020204030204" pitchFamily="49" charset="0"/>
               <a:cs typeface="Consolas" panose="020B0609020204030204" pitchFamily="49" charset="0"/>
             </a:endParaRPr>
@@ -14200,32 +14259,39 @@
               <a:buNone/>
             </a:pPr>
             <a:r>
-              <a:rPr lang="en-US" sz="1200" b="1" dirty="0" smtClean="0">
+              <a:rPr lang="en-US" sz="1600" b="1" dirty="0" smtClean="0">
                 <a:latin typeface="Consolas" panose="020B0609020204030204" pitchFamily="49" charset="0"/>
                 <a:cs typeface="Consolas" panose="020B0609020204030204" pitchFamily="49" charset="0"/>
               </a:rPr>
               <a:t>        </a:t>
             </a:r>
             <a:r>
-              <a:rPr lang="en-US" sz="1200" b="1" dirty="0">
+              <a:rPr lang="en-US" sz="1600" b="1" dirty="0">
                 <a:latin typeface="Consolas" panose="020B0609020204030204" pitchFamily="49" charset="0"/>
                 <a:cs typeface="Consolas" panose="020B0609020204030204" pitchFamily="49" charset="0"/>
               </a:rPr>
               <a:t>// </a:t>
             </a:r>
             <a:r>
-              <a:rPr lang="en-US" sz="1200" b="1" dirty="0" err="1">
+              <a:rPr lang="en-US" sz="1600" b="1" dirty="0" err="1">
                 <a:latin typeface="Consolas" panose="020B0609020204030204" pitchFamily="49" charset="0"/>
                 <a:cs typeface="Consolas" panose="020B0609020204030204" pitchFamily="49" charset="0"/>
               </a:rPr>
               <a:t>to_string</a:t>
             </a:r>
             <a:r>
-              <a:rPr lang="en-US" sz="1200" b="1" dirty="0">
-                <a:latin typeface="Consolas" panose="020B0609020204030204" pitchFamily="49" charset="0"/>
-                <a:cs typeface="Consolas" panose="020B0609020204030204" pitchFamily="49" charset="0"/>
-              </a:rPr>
-              <a:t>() prints different numbers of digits for floats depending on</a:t>
+              <a:rPr lang="en-US" sz="1600" b="1" dirty="0">
+                <a:latin typeface="Consolas" panose="020B0609020204030204" pitchFamily="49" charset="0"/>
+                <a:cs typeface="Consolas" panose="020B0609020204030204" pitchFamily="49" charset="0"/>
+              </a:rPr>
+              <a:t>() prints different numbers of </a:t>
+            </a:r>
+            <a:r>
+              <a:rPr lang="en-US" sz="1600" b="1" dirty="0" smtClean="0">
+                <a:latin typeface="Consolas" panose="020B0609020204030204" pitchFamily="49" charset="0"/>
+                <a:cs typeface="Consolas" panose="020B0609020204030204" pitchFamily="49" charset="0"/>
+              </a:rPr>
+              <a:t>digits</a:t>
             </a:r>
           </a:p>
           <a:p>
@@ -14233,27 +14299,88 @@
               <a:buNone/>
             </a:pPr>
             <a:r>
-              <a:rPr lang="en-US" sz="1200" b="1" dirty="0" smtClean="0">
-                <a:latin typeface="Consolas" panose="020B0609020204030204" pitchFamily="49" charset="0"/>
-                <a:cs typeface="Consolas" panose="020B0609020204030204" pitchFamily="49" charset="0"/>
-              </a:rPr>
-              <a:t>        </a:t>
-            </a:r>
-            <a:r>
-              <a:rPr lang="en-US" sz="1200" b="1" dirty="0">
-                <a:latin typeface="Consolas" panose="020B0609020204030204" pitchFamily="49" charset="0"/>
-                <a:cs typeface="Consolas" panose="020B0609020204030204" pitchFamily="49" charset="0"/>
-              </a:rPr>
-              <a:t>// platform and isn't available on Android, so we use </a:t>
-            </a:r>
-            <a:r>
-              <a:rPr lang="en-US" sz="1200" b="1" dirty="0" err="1">
+              <a:rPr lang="en-US" sz="1600" b="1" dirty="0">
+                <a:latin typeface="Consolas" panose="020B0609020204030204" pitchFamily="49" charset="0"/>
+                <a:cs typeface="Consolas" panose="020B0609020204030204" pitchFamily="49" charset="0"/>
+              </a:rPr>
+              <a:t> </a:t>
+            </a:r>
+            <a:r>
+              <a:rPr lang="en-US" sz="1600" b="1" dirty="0" smtClean="0">
+                <a:latin typeface="Consolas" panose="020B0609020204030204" pitchFamily="49" charset="0"/>
+                <a:cs typeface="Consolas" panose="020B0609020204030204" pitchFamily="49" charset="0"/>
+              </a:rPr>
+              <a:t>       // </a:t>
+            </a:r>
+            <a:r>
+              <a:rPr lang="en-US" sz="1600" b="1" dirty="0" smtClean="0">
+                <a:latin typeface="Consolas" panose="020B0609020204030204" pitchFamily="49" charset="0"/>
+                <a:cs typeface="Consolas" panose="020B0609020204030204" pitchFamily="49" charset="0"/>
+              </a:rPr>
+              <a:t>for </a:t>
+            </a:r>
+            <a:r>
+              <a:rPr lang="en-US" sz="1600" b="1" dirty="0">
+                <a:latin typeface="Consolas" panose="020B0609020204030204" pitchFamily="49" charset="0"/>
+                <a:cs typeface="Consolas" panose="020B0609020204030204" pitchFamily="49" charset="0"/>
+              </a:rPr>
+              <a:t>floats depending </a:t>
+            </a:r>
+            <a:r>
+              <a:rPr lang="en-US" sz="1600" b="1" dirty="0" smtClean="0">
+                <a:latin typeface="Consolas" panose="020B0609020204030204" pitchFamily="49" charset="0"/>
+                <a:cs typeface="Consolas" panose="020B0609020204030204" pitchFamily="49" charset="0"/>
+              </a:rPr>
+              <a:t>on platform </a:t>
+            </a:r>
+            <a:r>
+              <a:rPr lang="en-US" sz="1600" b="1" dirty="0">
+                <a:latin typeface="Consolas" panose="020B0609020204030204" pitchFamily="49" charset="0"/>
+                <a:cs typeface="Consolas" panose="020B0609020204030204" pitchFamily="49" charset="0"/>
+              </a:rPr>
+              <a:t>and isn't </a:t>
+            </a:r>
+            <a:r>
+              <a:rPr lang="en-US" sz="1600" b="1" dirty="0" smtClean="0">
+                <a:latin typeface="Consolas" panose="020B0609020204030204" pitchFamily="49" charset="0"/>
+                <a:cs typeface="Consolas" panose="020B0609020204030204" pitchFamily="49" charset="0"/>
+              </a:rPr>
+              <a:t>available</a:t>
+            </a:r>
+          </a:p>
+          <a:p>
+            <a:pPr marL="0" indent="0">
+              <a:buNone/>
+            </a:pPr>
+            <a:r>
+              <a:rPr lang="en-US" sz="1600" b="1" dirty="0" smtClean="0">
+                <a:latin typeface="Consolas" panose="020B0609020204030204" pitchFamily="49" charset="0"/>
+                <a:cs typeface="Consolas" panose="020B0609020204030204" pitchFamily="49" charset="0"/>
+              </a:rPr>
+              <a:t>        // </a:t>
+            </a:r>
+            <a:r>
+              <a:rPr lang="en-US" sz="1600" b="1" dirty="0" smtClean="0">
+                <a:latin typeface="Consolas" panose="020B0609020204030204" pitchFamily="49" charset="0"/>
+                <a:cs typeface="Consolas" panose="020B0609020204030204" pitchFamily="49" charset="0"/>
+              </a:rPr>
+              <a:t>on </a:t>
+            </a:r>
+            <a:r>
+              <a:rPr lang="en-US" sz="1600" b="1" dirty="0">
+                <a:latin typeface="Consolas" panose="020B0609020204030204" pitchFamily="49" charset="0"/>
+                <a:cs typeface="Consolas" panose="020B0609020204030204" pitchFamily="49" charset="0"/>
+              </a:rPr>
+              <a:t>Android, so we use </a:t>
+            </a:r>
+            <a:r>
+              <a:rPr lang="en-US" sz="1600" b="1" dirty="0" err="1">
                 <a:latin typeface="Consolas" panose="020B0609020204030204" pitchFamily="49" charset="0"/>
                 <a:cs typeface="Consolas" panose="020B0609020204030204" pitchFamily="49" charset="0"/>
               </a:rPr>
               <a:t>stringstream</a:t>
             </a:r>
-            <a:endParaRPr lang="en-US" sz="1200" b="1" dirty="0">
+            <a:endParaRPr lang="en-US" sz="1600" b="1" dirty="0">
               <a:latin typeface="Consolas" panose="020B0609020204030204" pitchFamily="49" charset="0"/>
               <a:cs typeface="Consolas" panose="020B0609020204030204" pitchFamily="49" charset="0"/>
             </a:endParaRPr>
@@ -14263,49 +14390,49 @@
               <a:buNone/>
             </a:pPr>
             <a:r>
-              <a:rPr lang="en-US" sz="1200" dirty="0" smtClean="0">
+              <a:rPr lang="en-US" sz="1600" dirty="0" smtClean="0">
                 <a:latin typeface="Consolas" panose="020B0609020204030204" pitchFamily="49" charset="0"/>
                 <a:cs typeface="Consolas" panose="020B0609020204030204" pitchFamily="49" charset="0"/>
               </a:rPr>
               <a:t>        </a:t>
             </a:r>
             <a:r>
-              <a:rPr lang="en-US" sz="1200" dirty="0" err="1">
+              <a:rPr lang="en-US" sz="1600" dirty="0" err="1">
                 <a:latin typeface="Consolas" panose="020B0609020204030204" pitchFamily="49" charset="0"/>
                 <a:cs typeface="Consolas" panose="020B0609020204030204" pitchFamily="49" charset="0"/>
               </a:rPr>
               <a:t>std</a:t>
             </a:r>
             <a:r>
-              <a:rPr lang="en-US" sz="1200" dirty="0">
+              <a:rPr lang="en-US" sz="1600" dirty="0">
                 <a:latin typeface="Consolas" panose="020B0609020204030204" pitchFamily="49" charset="0"/>
                 <a:cs typeface="Consolas" panose="020B0609020204030204" pitchFamily="49" charset="0"/>
               </a:rPr>
               <a:t>::</a:t>
             </a:r>
             <a:r>
-              <a:rPr lang="en-US" sz="1200" dirty="0" err="1">
+              <a:rPr lang="en-US" sz="1600" dirty="0" err="1">
                 <a:latin typeface="Consolas" panose="020B0609020204030204" pitchFamily="49" charset="0"/>
                 <a:cs typeface="Consolas" panose="020B0609020204030204" pitchFamily="49" charset="0"/>
               </a:rPr>
               <a:t>stringstream</a:t>
             </a:r>
             <a:r>
-              <a:rPr lang="en-US" sz="1200" dirty="0">
+              <a:rPr lang="en-US" sz="1600" dirty="0">
                 <a:latin typeface="Consolas" panose="020B0609020204030204" pitchFamily="49" charset="0"/>
                 <a:cs typeface="Consolas" panose="020B0609020204030204" pitchFamily="49" charset="0"/>
               </a:rPr>
               <a:t> </a:t>
             </a:r>
             <a:r>
-              <a:rPr lang="en-US" sz="1200" dirty="0" err="1">
+              <a:rPr lang="en-US" sz="1600" dirty="0" err="1">
                 <a:latin typeface="Consolas" panose="020B0609020204030204" pitchFamily="49" charset="0"/>
                 <a:cs typeface="Consolas" panose="020B0609020204030204" pitchFamily="49" charset="0"/>
               </a:rPr>
               <a:t>ss</a:t>
             </a:r>
             <a:r>
-              <a:rPr lang="en-US" sz="1200" dirty="0">
+              <a:rPr lang="en-US" sz="1600" dirty="0">
                 <a:latin typeface="Consolas" panose="020B0609020204030204" pitchFamily="49" charset="0"/>
                 <a:cs typeface="Consolas" panose="020B0609020204030204" pitchFamily="49" charset="0"/>
               </a:rPr>
@@ -14317,21 +14444,21 @@
               <a:buNone/>
             </a:pPr>
             <a:r>
-              <a:rPr lang="en-US" sz="1200" dirty="0" smtClean="0">
+              <a:rPr lang="en-US" sz="1600" dirty="0" smtClean="0">
                 <a:latin typeface="Consolas" panose="020B0609020204030204" pitchFamily="49" charset="0"/>
                 <a:cs typeface="Consolas" panose="020B0609020204030204" pitchFamily="49" charset="0"/>
               </a:rPr>
               <a:t>        </a:t>
             </a:r>
             <a:r>
-              <a:rPr lang="en-US" sz="1200" dirty="0" err="1">
+              <a:rPr lang="en-US" sz="1600" dirty="0" err="1">
                 <a:latin typeface="Consolas" panose="020B0609020204030204" pitchFamily="49" charset="0"/>
                 <a:cs typeface="Consolas" panose="020B0609020204030204" pitchFamily="49" charset="0"/>
               </a:rPr>
               <a:t>ss</a:t>
             </a:r>
             <a:r>
-              <a:rPr lang="en-US" sz="1200" dirty="0">
+              <a:rPr lang="en-US" sz="1600" dirty="0">
                 <a:latin typeface="Consolas" panose="020B0609020204030204" pitchFamily="49" charset="0"/>
                 <a:cs typeface="Consolas" panose="020B0609020204030204" pitchFamily="49" charset="0"/>
               </a:rPr>
@@ -14343,28 +14470,28 @@
               <a:buNone/>
             </a:pPr>
             <a:r>
-              <a:rPr lang="en-US" sz="1200" dirty="0" smtClean="0">
+              <a:rPr lang="en-US" sz="1600" dirty="0" smtClean="0">
                 <a:latin typeface="Consolas" panose="020B0609020204030204" pitchFamily="49" charset="0"/>
                 <a:cs typeface="Consolas" panose="020B0609020204030204" pitchFamily="49" charset="0"/>
               </a:rPr>
               <a:t>        </a:t>
             </a:r>
             <a:r>
-              <a:rPr lang="en-US" sz="1200" dirty="0">
+              <a:rPr lang="en-US" sz="1600" dirty="0">
                 <a:latin typeface="Consolas" panose="020B0609020204030204" pitchFamily="49" charset="0"/>
                 <a:cs typeface="Consolas" panose="020B0609020204030204" pitchFamily="49" charset="0"/>
               </a:rPr>
               <a:t>return </a:t>
             </a:r>
             <a:r>
-              <a:rPr lang="en-US" sz="1200" dirty="0" err="1">
+              <a:rPr lang="en-US" sz="1600" dirty="0" err="1">
                 <a:latin typeface="Consolas" panose="020B0609020204030204" pitchFamily="49" charset="0"/>
                 <a:cs typeface="Consolas" panose="020B0609020204030204" pitchFamily="49" charset="0"/>
               </a:rPr>
               <a:t>ss.str</a:t>
             </a:r>
             <a:r>
-              <a:rPr lang="en-US" sz="1200" dirty="0">
+              <a:rPr lang="en-US" sz="1600" dirty="0">
                 <a:latin typeface="Consolas" panose="020B0609020204030204" pitchFamily="49" charset="0"/>
                 <a:cs typeface="Consolas" panose="020B0609020204030204" pitchFamily="49" charset="0"/>
               </a:rPr>
@@ -14376,13 +14503,13 @@
               <a:buNone/>
             </a:pPr>
             <a:r>
-              <a:rPr lang="en-US" sz="1200" dirty="0" smtClean="0">
+              <a:rPr lang="en-US" sz="1600" dirty="0" smtClean="0">
                 <a:latin typeface="Consolas" panose="020B0609020204030204" pitchFamily="49" charset="0"/>
                 <a:cs typeface="Consolas" panose="020B0609020204030204" pitchFamily="49" charset="0"/>
               </a:rPr>
               <a:t>   }</a:t>
             </a:r>
-            <a:endParaRPr lang="en-US" sz="1200" dirty="0">
+            <a:endParaRPr lang="en-US" sz="1600" dirty="0">
               <a:latin typeface="Consolas" panose="020B0609020204030204" pitchFamily="49" charset="0"/>
               <a:cs typeface="Consolas" panose="020B0609020204030204" pitchFamily="49" charset="0"/>
             </a:endParaRPr>
@@ -14465,7 +14592,7 @@
         <p:spPr/>
         <p:txBody>
           <a:bodyPr>
-            <a:normAutofit/>
+            <a:normAutofit lnSpcReduction="10000"/>
           </a:bodyPr>
           <a:lstStyle/>
           <a:p>
@@ -14505,8 +14632,17 @@
             <a:pPr lvl="1"/>
             <a:r>
               <a:rPr lang="en-US" dirty="0" smtClean="0"/>
-              <a:t>Your IDE can be your friend: Hover…</a:t>
-            </a:r>
+              <a:t>Your IDE can be your friend: </a:t>
+            </a:r>
+            <a:r>
+              <a:rPr lang="en-US" i="1" dirty="0" smtClean="0"/>
+              <a:t>Hover </a:t>
+            </a:r>
+            <a:r>
+              <a:rPr lang="en-US" i="1" smtClean="0"/>
+              <a:t>with your mouse, Luke…</a:t>
+            </a:r>
+            <a:endParaRPr lang="en-US" i="1" dirty="0" smtClean="0"/>
           </a:p>
           <a:p>
             <a:r>
@@ -15858,7 +15994,11 @@
           <a:p>
             <a:r>
               <a:rPr lang="en-US" dirty="0" smtClean="0"/>
-              <a:t>What has happened?</a:t>
+              <a:t>What has happened</a:t>
+            </a:r>
+            <a:r>
+              <a:rPr lang="en-US" dirty="0" smtClean="0"/>
+              <a:t>?</a:t>
             </a:r>
             <a:endParaRPr lang="en-US" dirty="0"/>
           </a:p>
@@ -15890,15 +16030,32 @@
             <a:pPr lvl="1"/>
             <a:r>
               <a:rPr lang="en-US" dirty="0" smtClean="0"/>
-              <a:t>CPU cycles</a:t>
+              <a:t>doggy mobile devices </a:t>
+            </a:r>
+            <a:r>
+              <a:rPr lang="en-US" dirty="0" smtClean="0"/>
+              <a:t>want fewer </a:t>
+            </a:r>
+            <a:r>
+              <a:rPr lang="en-US" dirty="0" smtClean="0"/>
+              <a:t>CPU </a:t>
+            </a:r>
+            <a:r>
+              <a:rPr lang="en-US" dirty="0" smtClean="0"/>
+              <a:t>cycles</a:t>
             </a:r>
           </a:p>
           <a:p>
             <a:pPr lvl="1"/>
             <a:r>
               <a:rPr lang="en-US" dirty="0" smtClean="0"/>
-              <a:t>battery consumption</a:t>
-            </a:r>
+              <a:t>battery </a:t>
+            </a:r>
+            <a:r>
+              <a:rPr lang="en-US" dirty="0" smtClean="0"/>
+              <a:t>consumption: a big deal</a:t>
+            </a:r>
+            <a:endParaRPr lang="en-US" dirty="0" smtClean="0"/>
           </a:p>
           <a:p>
             <a:pPr lvl="1"/>
@@ -15912,7 +16069,15 @@
             </a:r>
             <a:r>
               <a:rPr lang="en-US" dirty="0" smtClean="0"/>
-              <a:t>-class citizen in the .NET ear of early 2000’s</a:t>
+              <a:t>-class citizen in the .NET </a:t>
+            </a:r>
+            <a:r>
+              <a:rPr lang="en-US" dirty="0" smtClean="0"/>
+              <a:t>era of </a:t>
+            </a:r>
+            <a:r>
+              <a:rPr lang="en-US" dirty="0" smtClean="0"/>
+              <a:t>early 2000’s</a:t>
             </a:r>
           </a:p>
           <a:p>
@@ -15940,21 +16105,50 @@
             <a:pPr lvl="1"/>
             <a:r>
               <a:rPr lang="en-US" dirty="0" smtClean="0"/>
-              <a:t>Temporally named “C++0x”</a:t>
+              <a:t>For a </a:t>
+            </a:r>
+            <a:r>
+              <a:rPr lang="en-US" i="1" dirty="0" smtClean="0"/>
+              <a:t>long time, </a:t>
+            </a:r>
+            <a:r>
+              <a:rPr lang="en-US" dirty="0" smtClean="0"/>
+              <a:t>temporarily named </a:t>
+            </a:r>
+            <a:r>
+              <a:rPr lang="en-US" dirty="0" smtClean="0"/>
+              <a:t>“C++0x”</a:t>
             </a:r>
           </a:p>
           <a:p>
             <a:pPr lvl="1"/>
             <a:r>
               <a:rPr lang="en-US" dirty="0" smtClean="0"/>
-              <a:t>Finally published, but now we’re in 2015</a:t>
-            </a:r>
-          </a:p>
-          <a:p>
-            <a:pPr lvl="1"/>
-            <a:r>
-              <a:rPr lang="en-US" dirty="0" smtClean="0"/>
-              <a:t>…and C++14 is about to be finalized</a:t>
+              <a:t>Finally </a:t>
+            </a:r>
+            <a:r>
+              <a:rPr lang="en-US" dirty="0" smtClean="0"/>
+              <a:t>published - but </a:t>
+            </a:r>
+            <a:r>
+              <a:rPr lang="en-US" dirty="0" smtClean="0"/>
+              <a:t>now we’re in </a:t>
+            </a:r>
+            <a:r>
+              <a:rPr lang="en-US" sz="3500" b="1" dirty="0" smtClean="0"/>
+              <a:t>2015</a:t>
+            </a:r>
+            <a:r>
+              <a:rPr lang="en-US" dirty="0" smtClean="0"/>
+              <a:t>…and </a:t>
+            </a:r>
+            <a:r>
+              <a:rPr lang="en-US" dirty="0" smtClean="0"/>
+              <a:t>C++14 is about to be </a:t>
+            </a:r>
+            <a:r>
+              <a:rPr lang="en-US" dirty="0" smtClean="0"/>
+              <a:t>finalized</a:t>
             </a:r>
             <a:endParaRPr lang="en-US" dirty="0"/>
           </a:p>
@@ -17869,7 +18063,15 @@
             </a:r>
             <a:r>
               <a:rPr lang="en-US" dirty="0"/>
-              <a:t> Library, for query/manipulation of paths, files and directories.</a:t>
+              <a:t> Library, </a:t>
+            </a:r>
+            <a:r>
+              <a:rPr lang="en-US" dirty="0" smtClean="0"/>
+              <a:t>for query/manipulation </a:t>
+            </a:r>
+            <a:r>
+              <a:rPr lang="en-US" dirty="0"/>
+              <a:t>of paths, files and directories.</a:t>
             </a:r>
           </a:p>
           <a:p>
@@ -17938,6 +18140,9 @@
             <a:endParaRPr lang="en-US" dirty="0"/>
           </a:p>
           <a:p>
+            <a:pPr marL="0" indent="0">
+              <a:buNone/>
+            </a:pPr>
             <a:r>
               <a:rPr lang="en-US" dirty="0"/>
               <a:t>Since the call for proposals for TR2, changes to ISO procedures meant that there will not be a TR2, instead enhancements to C++ will be published in a number of Technical Specifications. Some of the proposals listed above are already included in the C++ standard or in draft versions of the Technical Specifications</a:t>
@@ -17953,28 +18158,28 @@
             </a:endParaRPr>
           </a:p>
           <a:p>
-            <a:pPr marL="0" indent="0">
-              <a:buNone/>
-            </a:pPr>
-            <a:r>
-              <a:rPr lang="en-US" sz="1800" dirty="0" smtClean="0">
+            <a:pPr marL="0" indent="0" algn="ctr">
+              <a:buNone/>
+            </a:pPr>
+            <a:r>
+              <a:rPr lang="en-US" sz="2500" dirty="0" smtClean="0">
                 <a:hlinkClick r:id="rId15"/>
               </a:rPr>
               <a:t>https</a:t>
             </a:r>
             <a:r>
-              <a:rPr lang="en-US" sz="1800" dirty="0">
+              <a:rPr lang="en-US" sz="2500" dirty="0">
                 <a:hlinkClick r:id="rId15"/>
               </a:rPr>
               <a:t>://</a:t>
             </a:r>
             <a:r>
-              <a:rPr lang="en-US" sz="1800" dirty="0" smtClean="0">
+              <a:rPr lang="en-US" sz="2500" dirty="0" smtClean="0">
                 <a:hlinkClick r:id="rId15"/>
               </a:rPr>
               <a:t>en.wikipedia.org/wiki/C%2B%2B_Technical_Report_1#Technical_Report_2</a:t>
             </a:r>
-            <a:endParaRPr lang="en-US" sz="1800" dirty="0" smtClean="0"/>
+            <a:endParaRPr lang="en-US" sz="2500" dirty="0" smtClean="0"/>
           </a:p>
           <a:p>
             <a:pPr marL="0" indent="0">

</xml_diff>